<commit_message>
9Mar18 Corrected HomeScreen.jpg to be correct number of traits
</commit_message>
<xml_diff>
--- a/MyPackage/ShinyApp/HomeScreen.pptx
+++ b/MyPackage/ShinyApp/HomeScreen.pptx
@@ -106,7 +106,7 @@
   </p:defaultTextStyle>
   <p:extLst>
     <p:ext uri="{EFAFB233-063F-42B5-8137-9DF3F51BA10A}">
-      <p15:sldGuideLst xmlns="" xmlns:p15="http://schemas.microsoft.com/office/powerpoint/2012/main"/>
+      <p15:sldGuideLst xmlns:p15="http://schemas.microsoft.com/office/powerpoint/2012/main" xmlns=""/>
     </p:ext>
   </p:extLst>
 </p:presentation>
@@ -243,7 +243,7 @@
           <a:p>
             <a:fld id="{C3EA6240-1202-E147-8B12-415DCA4BDBE3}" type="datetimeFigureOut">
               <a:rPr lang="en-US" smtClean="0"/>
-              <a:t>15/11/17</a:t>
+              <a:t>9/3/18</a:t>
             </a:fld>
             <a:endParaRPr lang="en-US"/>
           </a:p>
@@ -408,7 +408,7 @@
           <a:p>
             <a:fld id="{C3EA6240-1202-E147-8B12-415DCA4BDBE3}" type="datetimeFigureOut">
               <a:rPr lang="en-US" smtClean="0"/>
-              <a:t>15/11/17</a:t>
+              <a:t>9/3/18</a:t>
             </a:fld>
             <a:endParaRPr lang="en-US"/>
           </a:p>
@@ -583,7 +583,7 @@
           <a:p>
             <a:fld id="{C3EA6240-1202-E147-8B12-415DCA4BDBE3}" type="datetimeFigureOut">
               <a:rPr lang="en-US" smtClean="0"/>
-              <a:t>15/11/17</a:t>
+              <a:t>9/3/18</a:t>
             </a:fld>
             <a:endParaRPr lang="en-US"/>
           </a:p>
@@ -748,7 +748,7 @@
           <a:p>
             <a:fld id="{C3EA6240-1202-E147-8B12-415DCA4BDBE3}" type="datetimeFigureOut">
               <a:rPr lang="en-US" smtClean="0"/>
-              <a:t>15/11/17</a:t>
+              <a:t>9/3/18</a:t>
             </a:fld>
             <a:endParaRPr lang="en-US"/>
           </a:p>
@@ -987,7 +987,7 @@
           <a:p>
             <a:fld id="{C3EA6240-1202-E147-8B12-415DCA4BDBE3}" type="datetimeFigureOut">
               <a:rPr lang="en-US" smtClean="0"/>
-              <a:t>15/11/17</a:t>
+              <a:t>9/3/18</a:t>
             </a:fld>
             <a:endParaRPr lang="en-US"/>
           </a:p>
@@ -1214,7 +1214,7 @@
           <a:p>
             <a:fld id="{C3EA6240-1202-E147-8B12-415DCA4BDBE3}" type="datetimeFigureOut">
               <a:rPr lang="en-US" smtClean="0"/>
-              <a:t>15/11/17</a:t>
+              <a:t>9/3/18</a:t>
             </a:fld>
             <a:endParaRPr lang="en-US"/>
           </a:p>
@@ -1576,7 +1576,7 @@
           <a:p>
             <a:fld id="{C3EA6240-1202-E147-8B12-415DCA4BDBE3}" type="datetimeFigureOut">
               <a:rPr lang="en-US" smtClean="0"/>
-              <a:t>15/11/17</a:t>
+              <a:t>9/3/18</a:t>
             </a:fld>
             <a:endParaRPr lang="en-US"/>
           </a:p>
@@ -1689,7 +1689,7 @@
           <a:p>
             <a:fld id="{C3EA6240-1202-E147-8B12-415DCA4BDBE3}" type="datetimeFigureOut">
               <a:rPr lang="en-US" smtClean="0"/>
-              <a:t>15/11/17</a:t>
+              <a:t>9/3/18</a:t>
             </a:fld>
             <a:endParaRPr lang="en-US"/>
           </a:p>
@@ -1779,7 +1779,7 @@
           <a:p>
             <a:fld id="{C3EA6240-1202-E147-8B12-415DCA4BDBE3}" type="datetimeFigureOut">
               <a:rPr lang="en-US" smtClean="0"/>
-              <a:t>15/11/17</a:t>
+              <a:t>9/3/18</a:t>
             </a:fld>
             <a:endParaRPr lang="en-US"/>
           </a:p>
@@ -2051,7 +2051,7 @@
           <a:p>
             <a:fld id="{C3EA6240-1202-E147-8B12-415DCA4BDBE3}" type="datetimeFigureOut">
               <a:rPr lang="en-US" smtClean="0"/>
-              <a:t>15/11/17</a:t>
+              <a:t>9/3/18</a:t>
             </a:fld>
             <a:endParaRPr lang="en-US"/>
           </a:p>
@@ -2303,7 +2303,7 @@
           <a:p>
             <a:fld id="{C3EA6240-1202-E147-8B12-415DCA4BDBE3}" type="datetimeFigureOut">
               <a:rPr lang="en-US" smtClean="0"/>
-              <a:t>15/11/17</a:t>
+              <a:t>9/3/18</a:t>
             </a:fld>
             <a:endParaRPr lang="en-US"/>
           </a:p>
@@ -2511,7 +2511,7 @@
           <a:p>
             <a:fld id="{C3EA6240-1202-E147-8B12-415DCA4BDBE3}" type="datetimeFigureOut">
               <a:rPr lang="en-US" smtClean="0"/>
-              <a:t>15/11/17</a:t>
+              <a:t>9/3/18</a:t>
             </a:fld>
             <a:endParaRPr lang="en-US"/>
           </a:p>
@@ -4928,27 +4928,7 @@
                   </a:schemeClr>
                 </a:solidFill>
               </a:rPr>
-              <a:t>                </a:t>
-            </a:r>
-            <a:r>
-              <a:rPr lang="en-US" sz="1400" dirty="0" smtClean="0">
-                <a:solidFill>
-                  <a:schemeClr val="bg1">
-                    <a:lumMod val="50000"/>
-                  </a:schemeClr>
-                </a:solidFill>
-              </a:rPr>
-              <a:t>plain </a:t>
-            </a:r>
-            <a:r>
-              <a:rPr lang="en-US" sz="1400" dirty="0" smtClean="0">
-                <a:solidFill>
-                  <a:schemeClr val="bg1">
-                    <a:lumMod val="50000"/>
-                  </a:schemeClr>
-                </a:solidFill>
-              </a:rPr>
-              <a:t>text</a:t>
+              <a:t>                plain text</a:t>
             </a:r>
             <a:endParaRPr lang="en-US" sz="1400" dirty="0">
               <a:solidFill>
@@ -6531,8 +6511,8 @@
         </p:nvSpPr>
         <p:spPr>
           <a:xfrm>
-            <a:off x="4455668" y="4435353"/>
-            <a:ext cx="1666529" cy="261610"/>
+            <a:off x="4631764" y="4263593"/>
+            <a:ext cx="1382679" cy="430887"/>
           </a:xfrm>
           <a:prstGeom prst="rect">
             <a:avLst/>
@@ -6547,7 +6527,26 @@
           <a:p>
             <a:r>
               <a:rPr lang="en-US" sz="1100" dirty="0"/>
-              <a:t>3 traits and 4 fixed effects</a:t>
+              <a:t>2</a:t>
+            </a:r>
+            <a:r>
+              <a:rPr lang="en-US" sz="1100" dirty="0" smtClean="0"/>
+              <a:t> traits (y1 &amp; y2) </a:t>
+            </a:r>
+            <a:r>
+              <a:rPr lang="en-US" sz="1100" dirty="0"/>
+              <a:t>and </a:t>
+            </a:r>
+            <a:endParaRPr lang="en-US" sz="1100" dirty="0" smtClean="0"/>
+          </a:p>
+          <a:p>
+            <a:r>
+              <a:rPr lang="en-US" sz="1100" dirty="0" smtClean="0"/>
+              <a:t>4 </a:t>
+            </a:r>
+            <a:r>
+              <a:rPr lang="en-US" sz="1100" dirty="0"/>
+              <a:t>fixed effects</a:t>
             </a:r>
           </a:p>
         </p:txBody>
@@ -9619,7 +9618,6 @@
               <a:rPr lang="en-US" dirty="0"/>
               <a:t>1</a:t>
             </a:r>
-            <a:endParaRPr lang="en-US" dirty="0"/>
           </a:p>
         </p:txBody>
       </p:sp>
@@ -11169,11 +11167,7 @@
           <a:p>
             <a:r>
               <a:rPr lang="en-US" sz="1200" dirty="0" smtClean="0"/>
-              <a:t>Matching genotype</a:t>
-            </a:r>
-            <a:r>
-              <a:rPr lang="en-US" sz="1200" dirty="0" smtClean="0"/>
-              <a:t> </a:t>
+              <a:t>Matching genotype </a:t>
             </a:r>
             <a:endParaRPr lang="en-US" sz="1200" dirty="0"/>
           </a:p>
@@ -11203,11 +11197,7 @@
           <a:p>
             <a:r>
               <a:rPr lang="en-US" sz="1200" dirty="0" smtClean="0"/>
-              <a:t>Matching trait value</a:t>
-            </a:r>
-            <a:r>
-              <a:rPr lang="en-US" sz="1200" dirty="0" smtClean="0"/>
-              <a:t> </a:t>
+              <a:t>Matching trait value </a:t>
             </a:r>
             <a:endParaRPr lang="en-US" sz="1200" dirty="0"/>
           </a:p>
@@ -11617,7 +11607,7 @@
   <a:extraClrSchemeLst/>
   <a:extLst>
     <a:ext uri="{05A4C25C-085E-4340-85A3-A5531E510DB2}">
-      <thm15:themeFamily xmlns="" xmlns:thm15="http://schemas.microsoft.com/office/thememl/2012/main" name="Office Theme" id="{62F939B6-93AF-4DB8-9C6B-D6C7DFDC589F}" vid="{4A3C46E8-61CC-4603-A589-7422A47A8E4A}"/>
+      <thm15:themeFamily xmlns:thm15="http://schemas.microsoft.com/office/thememl/2012/main" xmlns="" name="Office Theme" id="{62F939B6-93AF-4DB8-9C6B-D6C7DFDC589F}" vid="{4A3C46E8-61CC-4603-A589-7422A47A8E4A}"/>
     </a:ext>
   </a:extLst>
 </a:theme>

</xml_diff>